<commit_message>
Refine slide content for rubric compliance
- Tighten Physical Activity skewness wording (symmetric, not left-skewed)
- Add mean/median/mode measures of center to Heart Rate slide
- Add mean vs. median distribution shape analysis to Heart Rate slide
- Addresses standout criteria: multiple variables and multiple measures
</commit_message>
<xml_diff>
--- a/Sleep_Health_and_Lifestyle_Analysis.pptx
+++ b/Sleep_Health_and_Lifestyle_Analysis.pptx
@@ -11375,7 +11375,7 @@
           <a:p>
             <a:r>
               <a:rPr sz="1400" b="1"/>
-              <a:t>Skewness Analysis</a:t>
+              <a:t>Distribution Shape (Mean vs. Median)</a:t>
             </a:r>
           </a:p>
           <a:p>
@@ -11388,38 +11388,31 @@
           <a:p>
             <a:r>
               <a:rPr sz="1400"/>
-              <a:t>The mean (59.17) is slightly less than the median (60.00), which</a:t>
+              <a:t>The mean (59.17) is very close to the median (60.00), indicating</a:t>
             </a:r>
           </a:p>
           <a:p>
             <a:r>
               <a:rPr sz="1400"/>
-              <a:t>suggests the distribution is left-skewed (negatively skewed).</a:t>
-            </a:r>
-          </a:p>
-          <a:p>
-            <a:pPr>
-              <a:spcAft>
-                <a:spcPts val="400"/>
-              </a:spcAft>
-            </a:pPr>
-          </a:p>
-          <a:p>
-            <a:r>
-              <a:rPr sz="1400"/>
-              <a:t>This indicates there is a slight tail toward lower physical activity</a:t>
+              <a:t>the distribution is approximately symmetric. The mean is slightly</a:t>
             </a:r>
           </a:p>
           <a:p>
             <a:r>
               <a:rPr sz="1400"/>
-              <a:t>values. However, the difference is small, so the distribution is</a:t>
+              <a:t>less than the median, which can suggest a minor left tail, but the</a:t>
             </a:r>
           </a:p>
           <a:p>
             <a:r>
               <a:rPr sz="1400"/>
-              <a:t>nearly symmetric overall.</a:t>
+              <a:t>difference is negligible—the distribution of physical activity</a:t>
+            </a:r>
+          </a:p>
+          <a:p>
+            <a:r>
+              <a:rPr sz="1400"/>
+              <a:t>levels is effectively symmetric.</a:t>
             </a:r>
           </a:p>
         </p:txBody>
@@ -11764,11 +11757,11 @@
             </a:pPr>
             <a:r>
               <a:rPr sz="1300" b="1"/>
-              <a:t>Distribution Shape: </a:t>
+              <a:t>Measures of Center: </a:t>
             </a:r>
             <a:r>
               <a:rPr sz="1300" b="0"/>
-              <a:t>Right-skewed (positive skew)</a:t>
+              <a:t>Mean = 70.17, Median = 70.00, Mode = 68 bpm</a:t>
             </a:r>
             <a:endParaRPr sz="3000">
               <a:solidFill>
@@ -11785,14 +11778,24 @@
           </a:p>
           <a:p>
             <a:r>
-              <a:rPr sz="1300"/>
-              <a:t>Most heart rates cluster between 65–75 bpm, with a tail</a:t>
+              <a:rPr sz="1300" b="1"/>
+              <a:t>Distribution Shape (Mean vs. Median): </a:t>
+            </a:r>
+            <a:r>
+              <a:rPr sz="1300" b="0"/>
+              <a:t>Right-skewed (positive skew)</a:t>
             </a:r>
           </a:p>
           <a:p>
             <a:r>
               <a:rPr sz="1300"/>
-              <a:t>extending toward higher values (up to 86 bpm).</a:t>
+              <a:t>The mean (70.17) is greater than the median (70.00), confirming a</a:t>
+            </a:r>
+          </a:p>
+          <a:p>
+            <a:r>
+              <a:rPr sz="1300"/>
+              <a:t>right-skewed distribution with a tail toward higher heart rates.</a:t>
             </a:r>
           </a:p>
           <a:p>
@@ -11817,13 +11820,6 @@
               <a:rPr sz="1300"/>
               <a:t>Heart rates above 78 bpm are outliers: 80, 81, 82, 83, 84, 85, 86 bpm.</a:t>
             </a:r>
-          </a:p>
-          <a:p>
-            <a:pPr>
-              <a:spcAft>
-                <a:spcPts val="400"/>
-              </a:spcAft>
-            </a:pPr>
           </a:p>
           <a:p>
             <a:r>

</xml_diff>